<commit_message>
Re #1 last minutes minor changes to users documentation
</commit_message>
<xml_diff>
--- a/documentation/design_forV4/Horace&PACE.pptx
+++ b/documentation/design_forV4/Horace&PACE.pptx
@@ -3178,7 +3178,7 @@
         <p:spPr>
           <a:xfrm>
             <a:off x="535577" y="5765776"/>
-            <a:ext cx="7565276" cy="738664"/>
+            <a:ext cx="8120428" cy="738664"/>
           </a:xfrm>
           <a:prstGeom prst="rect">
             <a:avLst/>
@@ -3199,7 +3199,7 @@
           <a:p>
             <a:r>
               <a:rPr lang="en-GB" dirty="0" smtClean="0"/>
-              <a:t>Mainly IO speed bound performance, though some other usage examples exist.</a:t>
+              <a:t>Mainly IO speed bound performance, though some less often used critical area exist</a:t>
             </a:r>
             <a:endParaRPr lang="en-GB" dirty="0"/>
           </a:p>
@@ -3715,19 +3715,22 @@
       <p:cxnSp>
         <p:nvCxnSpPr>
           <p:cNvPr id="8" name="Elbow Connector 7"/>
-          <p:cNvCxnSpPr/>
+          <p:cNvCxnSpPr>
+            <a:stCxn id="4" idx="3"/>
+          </p:cNvCxnSpPr>
           <p:nvPr/>
         </p:nvCxnSpPr>
         <p:spPr>
-          <a:xfrm rot="16200000" flipH="1">
-            <a:off x="3750580" y="3288854"/>
-            <a:ext cx="1595675" cy="1228265"/>
+          <a:xfrm>
+            <a:off x="3934285" y="2841205"/>
+            <a:ext cx="1228265" cy="1859619"/>
           </a:xfrm>
-          <a:prstGeom prst="bentConnector3">
+          <a:prstGeom prst="bentConnector2">
             <a:avLst/>
           </a:prstGeom>
           <a:ln>
-            <a:tailEnd type="triangle"/>
+            <a:headEnd type="stealth"/>
+            <a:tailEnd type="stealth"/>
           </a:ln>
         </p:spPr>
         <p:style>
@@ -3789,7 +3792,7 @@
         </p:nvSpPr>
         <p:spPr>
           <a:xfrm>
-            <a:off x="3934285" y="3376782"/>
+            <a:off x="4038879" y="2190519"/>
             <a:ext cx="2954527" cy="646331"/>
           </a:xfrm>
           <a:prstGeom prst="rect">
@@ -16256,7 +16259,7 @@
         <p:spPr>
           <a:xfrm>
             <a:off x="850750" y="3193798"/>
-            <a:ext cx="10515600" cy="2604573"/>
+            <a:ext cx="10515600" cy="3260790"/>
           </a:xfrm>
           <a:prstGeom prst="rect">
             <a:avLst/>
@@ -16264,7 +16267,7 @@
         </p:spPr>
         <p:txBody>
           <a:bodyPr vert="horz" lIns="91440" tIns="45720" rIns="91440" bIns="45720" rtlCol="0">
-            <a:normAutofit fontScale="92500" lnSpcReduction="10000"/>
+            <a:normAutofit lnSpcReduction="10000"/>
           </a:bodyPr>
           <a:lstStyle>
             <a:lvl1pPr marL="228600" indent="-228600" algn="l" defTabSz="914400" rtl="0" eaLnBrk="1" latinLnBrk="0" hangingPunct="1">
@@ -16479,6 +16482,12 @@
               <a:rPr lang="en-GB" dirty="0" smtClean="0"/>
               <a:t>Where it is (Herbert and Horace are the same package)</a:t>
             </a:r>
+          </a:p>
+          <a:p>
+            <a:r>
+              <a:rPr lang="en-GB" dirty="0" smtClean="0"/>
+              <a:t>Release notes</a:t>
+            </a:r>
             <a:endParaRPr lang="en-GB" dirty="0"/>
           </a:p>
         </p:txBody>
@@ -16553,10 +16562,24 @@
             <p:ph idx="1"/>
           </p:nvPr>
         </p:nvSpPr>
-        <p:spPr/>
+        <p:spPr>
+          <a:xfrm>
+            <a:off x="838200" y="3463961"/>
+            <a:ext cx="10515600" cy="2713001"/>
+          </a:xfrm>
+        </p:spPr>
         <p:txBody>
           <a:bodyPr/>
           <a:lstStyle/>
+          <a:p>
+            <a:pPr marL="0" indent="0">
+              <a:buNone/>
+            </a:pPr>
+            <a:r>
+              <a:rPr lang="en-GB" dirty="0" smtClean="0"/>
+              <a:t>Modern continuous integration:</a:t>
+            </a:r>
+          </a:p>
           <a:p>
             <a:r>
               <a:rPr lang="en-GB" dirty="0" smtClean="0"/>
@@ -16579,6 +16602,73 @@
             <a:r>
               <a:rPr lang="en-GB" dirty="0" smtClean="0"/>
               <a:t>Care about mac users?</a:t>
+            </a:r>
+            <a:endParaRPr lang="en-GB" dirty="0"/>
+          </a:p>
+        </p:txBody>
+      </p:sp>
+      <p:sp>
+        <p:nvSpPr>
+          <p:cNvPr id="4" name="TextBox 3"/>
+          <p:cNvSpPr txBox="1"/>
+          <p:nvPr/>
+        </p:nvSpPr>
+        <p:spPr>
+          <a:xfrm>
+            <a:off x="838200" y="1690688"/>
+            <a:ext cx="10515600" cy="1077218"/>
+          </a:xfrm>
+          <a:prstGeom prst="rect">
+            <a:avLst/>
+          </a:prstGeom>
+          <a:noFill/>
+        </p:spPr>
+        <p:txBody>
+          <a:bodyPr wrap="square" rtlCol="0">
+            <a:spAutoFit/>
+          </a:bodyPr>
+          <a:lstStyle/>
+          <a:p>
+            <a:r>
+              <a:rPr lang="en-GB" sz="2400" dirty="0" smtClean="0"/>
+              <a:t>Current </a:t>
+            </a:r>
+            <a:r>
+              <a:rPr lang="en-GB" sz="2800" dirty="0" smtClean="0"/>
+              <a:t>release</a:t>
+            </a:r>
+            <a:r>
+              <a:rPr lang="en-GB" sz="2400" dirty="0" smtClean="0"/>
+              <a:t> procedure</a:t>
+            </a:r>
+            <a:r>
+              <a:rPr lang="en-GB" dirty="0" smtClean="0"/>
+              <a:t>:</a:t>
+            </a:r>
+          </a:p>
+          <a:p>
+            <a:r>
+              <a:rPr lang="en-GB" dirty="0" smtClean="0"/>
+              <a:t>Run test script and packing procedure manually. Update production branch on ISISCOMPUTE and </a:t>
+            </a:r>
+            <a:r>
+              <a:rPr lang="en-GB" dirty="0" err="1" smtClean="0"/>
+              <a:t>iDaaaS</a:t>
+            </a:r>
+            <a:endParaRPr lang="en-GB" dirty="0" smtClean="0"/>
+          </a:p>
+          <a:p>
+            <a:r>
+              <a:rPr lang="en-GB" dirty="0" smtClean="0"/>
+              <a:t>(tests are failing running on </a:t>
+            </a:r>
+            <a:r>
+              <a:rPr lang="en-GB" dirty="0" err="1" smtClean="0"/>
+              <a:t>iDaaaS</a:t>
+            </a:r>
+            <a:r>
+              <a:rPr lang="en-GB" dirty="0" smtClean="0"/>
+              <a:t>)</a:t>
             </a:r>
             <a:endParaRPr lang="en-GB" dirty="0"/>
           </a:p>

</xml_diff>